<commit_message>
Update slides for ggplot2 p1
</commit_message>
<xml_diff>
--- a/notes/ggplot2_part1.pptx
+++ b/notes/ggplot2_part1.pptx
@@ -22,16 +22,17 @@
     <p:sldId id="267" r:id="rId16"/>
     <p:sldId id="268" r:id="rId17"/>
     <p:sldId id="269" r:id="rId18"/>
-    <p:sldId id="271" r:id="rId19"/>
-    <p:sldId id="272" r:id="rId20"/>
-    <p:sldId id="273" r:id="rId21"/>
-    <p:sldId id="274" r:id="rId22"/>
-    <p:sldId id="275" r:id="rId23"/>
-    <p:sldId id="278" r:id="rId24"/>
-    <p:sldId id="279" r:id="rId25"/>
-    <p:sldId id="277" r:id="rId26"/>
-    <p:sldId id="280" r:id="rId27"/>
-    <p:sldId id="281" r:id="rId28"/>
+    <p:sldId id="283" r:id="rId19"/>
+    <p:sldId id="271" r:id="rId20"/>
+    <p:sldId id="272" r:id="rId21"/>
+    <p:sldId id="273" r:id="rId22"/>
+    <p:sldId id="274" r:id="rId23"/>
+    <p:sldId id="275" r:id="rId24"/>
+    <p:sldId id="278" r:id="rId25"/>
+    <p:sldId id="279" r:id="rId26"/>
+    <p:sldId id="277" r:id="rId27"/>
+    <p:sldId id="280" r:id="rId28"/>
+    <p:sldId id="281" r:id="rId29"/>
   </p:sldIdLst>
   <p:sldSz cx="9144000" cy="5143500" type="screen16x9"/>
   <p:notesSz cx="6858000" cy="9144000"/>
@@ -130,6 +131,22 @@
       </a:defRPr>
     </a:lvl9pPr>
   </p:defaultTextStyle>
+  <p:extLst>
+    <p:ext uri="{EFAFB233-063F-42B5-8137-9DF3F51BA10A}">
+      <p15:sldGuideLst xmlns:p15="http://schemas.microsoft.com/office/powerpoint/2012/main">
+        <p15:guide id="1" orient="horz" pos="1620">
+          <p15:clr>
+            <a:srgbClr val="A4A3A4"/>
+          </p15:clr>
+        </p15:guide>
+        <p15:guide id="2" pos="2880">
+          <p15:clr>
+            <a:srgbClr val="A4A3A4"/>
+          </p15:clr>
+        </p15:guide>
+      </p15:sldGuideLst>
+    </p:ext>
+  </p:extLst>
 </p:presentation>
 </file>
 
@@ -311,7 +328,7 @@
           <a:lstStyle/>
           <a:p>
             <a:fld id="{A65958ED-12ED-1142-8369-DADF60CDC5D9}" type="datetimeFigureOut">
-              <a:t>9/23/13</a:t>
+              <a:t>9/20/16</a:t>
             </a:fld>
             <a:endParaRPr lang="en-US"/>
           </a:p>
@@ -477,7 +494,7 @@
           <a:lstStyle/>
           <a:p>
             <a:fld id="{A65958ED-12ED-1142-8369-DADF60CDC5D9}" type="datetimeFigureOut">
-              <a:t>9/23/13</a:t>
+              <a:t>9/20/16</a:t>
             </a:fld>
             <a:endParaRPr lang="en-US"/>
           </a:p>
@@ -653,7 +670,7 @@
           <a:lstStyle/>
           <a:p>
             <a:fld id="{A65958ED-12ED-1142-8369-DADF60CDC5D9}" type="datetimeFigureOut">
-              <a:t>9/23/13</a:t>
+              <a:t>9/20/16</a:t>
             </a:fld>
             <a:endParaRPr lang="en-US"/>
           </a:p>
@@ -819,7 +836,7 @@
           <a:lstStyle/>
           <a:p>
             <a:fld id="{A65958ED-12ED-1142-8369-DADF60CDC5D9}" type="datetimeFigureOut">
-              <a:t>9/23/13</a:t>
+              <a:t>9/20/16</a:t>
             </a:fld>
             <a:endParaRPr lang="en-US"/>
           </a:p>
@@ -1062,7 +1079,7 @@
           <a:lstStyle/>
           <a:p>
             <a:fld id="{A65958ED-12ED-1142-8369-DADF60CDC5D9}" type="datetimeFigureOut">
-              <a:t>9/23/13</a:t>
+              <a:t>9/20/16</a:t>
             </a:fld>
             <a:endParaRPr lang="en-US"/>
           </a:p>
@@ -1345,7 +1362,7 @@
           <a:lstStyle/>
           <a:p>
             <a:fld id="{A65958ED-12ED-1142-8369-DADF60CDC5D9}" type="datetimeFigureOut">
-              <a:t>9/23/13</a:t>
+              <a:t>9/20/16</a:t>
             </a:fld>
             <a:endParaRPr lang="en-US"/>
           </a:p>
@@ -1767,7 +1784,7 @@
           <a:lstStyle/>
           <a:p>
             <a:fld id="{A65958ED-12ED-1142-8369-DADF60CDC5D9}" type="datetimeFigureOut">
-              <a:t>9/23/13</a:t>
+              <a:t>9/20/16</a:t>
             </a:fld>
             <a:endParaRPr lang="en-US"/>
           </a:p>
@@ -1882,7 +1899,7 @@
           <a:lstStyle/>
           <a:p>
             <a:fld id="{A65958ED-12ED-1142-8369-DADF60CDC5D9}" type="datetimeFigureOut">
-              <a:t>9/23/13</a:t>
+              <a:t>9/20/16</a:t>
             </a:fld>
             <a:endParaRPr lang="en-US"/>
           </a:p>
@@ -1975,7 +1992,7 @@
           <a:lstStyle/>
           <a:p>
             <a:fld id="{A65958ED-12ED-1142-8369-DADF60CDC5D9}" type="datetimeFigureOut">
-              <a:t>9/23/13</a:t>
+              <a:t>9/20/16</a:t>
             </a:fld>
             <a:endParaRPr lang="en-US"/>
           </a:p>
@@ -2248,7 +2265,7 @@
           <a:lstStyle/>
           <a:p>
             <a:fld id="{A65958ED-12ED-1142-8369-DADF60CDC5D9}" type="datetimeFigureOut">
-              <a:t>9/23/13</a:t>
+              <a:t>9/20/16</a:t>
             </a:fld>
             <a:endParaRPr lang="en-US"/>
           </a:p>
@@ -2498,7 +2515,7 @@
           <a:lstStyle/>
           <a:p>
             <a:fld id="{A65958ED-12ED-1142-8369-DADF60CDC5D9}" type="datetimeFigureOut">
-              <a:t>9/23/13</a:t>
+              <a:t>9/20/16</a:t>
             </a:fld>
             <a:endParaRPr lang="en-US"/>
           </a:p>
@@ -2707,7 +2724,7 @@
           </a:lstStyle>
           <a:p>
             <a:fld id="{A65958ED-12ED-1142-8369-DADF60CDC5D9}" type="datetimeFigureOut">
-              <a:t>9/23/13</a:t>
+              <a:t>9/20/16</a:t>
             </a:fld>
             <a:endParaRPr lang="en-US"/>
           </a:p>
@@ -3202,48 +3219,61 @@
           <a:lstStyle/>
           <a:p>
             <a:r>
-              <a:rPr lang="en-US"/>
+              <a:rPr lang="en-US" dirty="0" smtClean="0"/>
+              <a:t>Looks </a:t>
+            </a:r>
+            <a:r>
+              <a:rPr lang="en-US" dirty="0"/>
+              <a:t>for data in a data frame, similar to lattice, or in the parent environment</a:t>
+            </a:r>
+          </a:p>
+          <a:p>
+            <a:r>
+              <a:rPr lang="en-US" dirty="0"/>
+              <a:t>Plots are made up of </a:t>
+            </a:r>
+            <a:r>
+              <a:rPr lang="en-US" i="1" dirty="0"/>
+              <a:t>aesthetics</a:t>
+            </a:r>
+            <a:r>
+              <a:rPr lang="en-US" dirty="0"/>
+              <a:t> (size, shape, color) and </a:t>
+            </a:r>
+            <a:r>
+              <a:rPr lang="en-US" i="1" dirty="0" err="1"/>
+              <a:t>geoms</a:t>
+            </a:r>
+            <a:r>
+              <a:rPr lang="en-US" dirty="0"/>
+              <a:t> (points, lines</a:t>
+            </a:r>
+            <a:r>
+              <a:rPr lang="en-US" dirty="0" smtClean="0"/>
+              <a:t>)</a:t>
+            </a:r>
+          </a:p>
+          <a:p>
+            <a:r>
+              <a:rPr lang="en-US" dirty="0"/>
               <a:t>Works much like the </a:t>
             </a:r>
             <a:r>
-              <a:rPr lang="en-US">
+              <a:rPr lang="en-US" dirty="0">
                 <a:latin typeface="Courier"/>
                 <a:cs typeface="Courier"/>
               </a:rPr>
               <a:t>plot</a:t>
             </a:r>
             <a:r>
-              <a:rPr lang="en-US"/>
-              <a:t> function in base graphics system</a:t>
-            </a:r>
-          </a:p>
-          <a:p>
-            <a:r>
-              <a:rPr lang="en-US"/>
-              <a:t>Looks for data in a data frame, similar to lattice, or in the parent environment</a:t>
-            </a:r>
-          </a:p>
-          <a:p>
-            <a:r>
-              <a:rPr lang="en-US"/>
-              <a:t>Plots are made up of </a:t>
-            </a:r>
-            <a:r>
-              <a:rPr lang="en-US" i="1"/>
-              <a:t>aesthetics</a:t>
-            </a:r>
-            <a:r>
-              <a:rPr lang="en-US"/>
-              <a:t> (size, shape, color) and </a:t>
-            </a:r>
-            <a:r>
-              <a:rPr lang="en-US" i="1"/>
-              <a:t>geoms</a:t>
-            </a:r>
-            <a:r>
-              <a:rPr lang="en-US"/>
-              <a:t> (points, lines)</a:t>
-            </a:r>
+              <a:rPr lang="en-US" dirty="0"/>
+              <a:t> function in base graphics </a:t>
+            </a:r>
+            <a:r>
+              <a:rPr lang="en-US" dirty="0" smtClean="0"/>
+              <a:t>system</a:t>
+            </a:r>
+            <a:endParaRPr lang="en-US" dirty="0"/>
           </a:p>
         </p:txBody>
       </p:sp>
@@ -3260,7 +3290,7 @@
   <p:timing>
     <p:tnLst>
       <p:par>
-        <p:cTn xmlns:p14="http://schemas.microsoft.com/office/powerpoint/2010/main" id="1" dur="indefinite" restart="never" nodeType="tmRoot"/>
+        <p:cTn id="1" dur="indefinite" restart="never" nodeType="tmRoot"/>
       </p:par>
     </p:tnLst>
   </p:timing>
@@ -3327,29 +3357,67 @@
         <p:spPr/>
         <p:txBody>
           <a:bodyPr>
-            <a:normAutofit lnSpcReduction="10000"/>
+            <a:normAutofit fontScale="92500" lnSpcReduction="20000"/>
           </a:bodyPr>
           <a:lstStyle/>
           <a:p>
             <a:r>
-              <a:rPr lang="en-US"/>
-              <a:t>Factors are important for indicating subsets of the data (if they are to have different properties); they should be </a:t>
-            </a:r>
-            <a:r>
-              <a:rPr lang="en-US" b="1"/>
+              <a:rPr lang="en-US" dirty="0"/>
+              <a:t>Data need to be tidy (and usually in long format)</a:t>
+            </a:r>
+          </a:p>
+          <a:p>
+            <a:r>
+              <a:rPr lang="en-US" dirty="0" smtClean="0"/>
+              <a:t>Factors </a:t>
+            </a:r>
+            <a:r>
+              <a:rPr lang="en-US" dirty="0"/>
+              <a:t>are important for indicating subsets of the data (if they are to have different properties</a:t>
+            </a:r>
+            <a:r>
+              <a:rPr lang="en-US" dirty="0" smtClean="0"/>
+              <a:t>) and annotating points; factors </a:t>
+            </a:r>
+            <a:r>
+              <a:rPr lang="en-US" dirty="0"/>
+              <a:t>should be </a:t>
+            </a:r>
+            <a:r>
+              <a:rPr lang="en-US" b="1" dirty="0" smtClean="0"/>
               <a:t>labeled</a:t>
             </a:r>
           </a:p>
           <a:p>
             <a:r>
-              <a:rPr lang="en-US"/>
-              <a:t>The qplot() hides what goes on underneath, which is okay for most operations</a:t>
-            </a:r>
-          </a:p>
-          <a:p>
-            <a:r>
-              <a:rPr lang="en-US"/>
-              <a:t>ggplot() is the core function and very flexible for doing things qplot() cannot do</a:t>
+              <a:rPr lang="en-US" dirty="0" smtClean="0"/>
+              <a:t>The </a:t>
+            </a:r>
+            <a:r>
+              <a:rPr lang="en-US" dirty="0" err="1"/>
+              <a:t>qplot</a:t>
+            </a:r>
+            <a:r>
+              <a:rPr lang="en-US" dirty="0"/>
+              <a:t>() hides what goes on underneath, which is okay for most operations</a:t>
+            </a:r>
+          </a:p>
+          <a:p>
+            <a:r>
+              <a:rPr lang="en-US" dirty="0" err="1"/>
+              <a:t>ggplot</a:t>
+            </a:r>
+            <a:r>
+              <a:rPr lang="en-US" dirty="0"/>
+              <a:t>() is the core function and very flexible for doing things </a:t>
+            </a:r>
+            <a:r>
+              <a:rPr lang="en-US" dirty="0" err="1"/>
+              <a:t>qplot</a:t>
+            </a:r>
+            <a:r>
+              <a:rPr lang="en-US" dirty="0"/>
+              <a:t>() cannot do</a:t>
             </a:r>
           </a:p>
         </p:txBody>
@@ -3364,6 +3432,13 @@
   <p:clrMapOvr>
     <a:masterClrMapping/>
   </p:clrMapOvr>
+  <p:timing>
+    <p:tnLst>
+      <p:par>
+        <p:cTn id="1" dur="indefinite" restart="never" nodeType="tmRoot"/>
+      </p:par>
+    </p:tnLst>
+  </p:timing>
 </p:sld>
 </file>
 
@@ -3560,7 +3635,7 @@
   <p:timing>
     <p:tnLst>
       <p:par>
-        <p:cTn xmlns:p14="http://schemas.microsoft.com/office/powerpoint/2010/main" id="1" dur="indefinite" restart="never" nodeType="tmRoot">
+        <p:cTn id="1" dur="indefinite" restart="never" nodeType="tmRoot">
           <p:childTnLst>
             <p:seq concurrent="1" nextAc="seek">
               <p:cTn id="2" dur="indefinite" nodeType="mainSeq">
@@ -4031,7 +4106,7 @@
   <p:timing>
     <p:tnLst>
       <p:par>
-        <p:cTn xmlns:p14="http://schemas.microsoft.com/office/powerpoint/2010/main" id="1" dur="indefinite" restart="never" nodeType="tmRoot"/>
+        <p:cTn id="1" dur="indefinite" restart="never" nodeType="tmRoot"/>
       </p:par>
     </p:tnLst>
   </p:timing>
@@ -4301,7 +4376,7 @@
   <p:timing>
     <p:tnLst>
       <p:par>
-        <p:cTn xmlns:p14="http://schemas.microsoft.com/office/powerpoint/2010/main" id="1" dur="indefinite" restart="never" nodeType="tmRoot"/>
+        <p:cTn id="1" dur="indefinite" restart="never" nodeType="tmRoot"/>
       </p:par>
     </p:tnLst>
   </p:timing>
@@ -4419,7 +4494,7 @@
   <p:timing>
     <p:tnLst>
       <p:par>
-        <p:cTn xmlns:p14="http://schemas.microsoft.com/office/powerpoint/2010/main" id="1" dur="indefinite" restart="never" nodeType="tmRoot"/>
+        <p:cTn id="1" dur="indefinite" restart="never" nodeType="tmRoot"/>
       </p:par>
     </p:tnLst>
   </p:timing>
@@ -4537,7 +4612,7 @@
   <p:timing>
     <p:tnLst>
       <p:par>
-        <p:cTn xmlns:p14="http://schemas.microsoft.com/office/powerpoint/2010/main" id="1" dur="indefinite" restart="never" nodeType="tmRoot"/>
+        <p:cTn id="1" dur="indefinite" restart="never" nodeType="tmRoot"/>
       </p:par>
     </p:tnLst>
   </p:timing>
@@ -4734,7 +4809,7 @@
   <p:timing>
     <p:tnLst>
       <p:par>
-        <p:cTn xmlns:p14="http://schemas.microsoft.com/office/powerpoint/2010/main" id="1" dur="indefinite" restart="never" nodeType="tmRoot"/>
+        <p:cTn id="1" dur="indefinite" restart="never" nodeType="tmRoot"/>
       </p:par>
     </p:tnLst>
   </p:timing>
@@ -4742,6 +4817,113 @@
 </file>
 
 <file path=ppt/slides/slide18.xml><?xml version="1.0" encoding="utf-8"?>
+<p:sld xmlns:a="http://schemas.openxmlformats.org/drawingml/2006/main" xmlns:r="http://schemas.openxmlformats.org/officeDocument/2006/relationships" xmlns:p="http://schemas.openxmlformats.org/presentationml/2006/main">
+  <p:cSld>
+    <p:spTree>
+      <p:nvGrpSpPr>
+        <p:cNvPr id="1" name=""/>
+        <p:cNvGrpSpPr/>
+        <p:nvPr/>
+      </p:nvGrpSpPr>
+      <p:grpSpPr>
+        <a:xfrm>
+          <a:off x="0" y="0"/>
+          <a:ext cx="0" cy="0"/>
+          <a:chOff x="0" y="0"/>
+          <a:chExt cx="0" cy="0"/>
+        </a:xfrm>
+      </p:grpSpPr>
+      <p:sp>
+        <p:nvSpPr>
+          <p:cNvPr id="2" name="Title 1"/>
+          <p:cNvSpPr>
+            <a:spLocks noGrp="1"/>
+          </p:cNvSpPr>
+          <p:nvPr>
+            <p:ph type="title"/>
+          </p:nvPr>
+        </p:nvSpPr>
+        <p:spPr/>
+        <p:txBody>
+          <a:bodyPr/>
+          <a:lstStyle/>
+          <a:p>
+            <a:r>
+              <a:rPr lang="en-US"/>
+              <a:t>MAACS Cohort</a:t>
+            </a:r>
+          </a:p>
+        </p:txBody>
+      </p:sp>
+      <p:sp>
+        <p:nvSpPr>
+          <p:cNvPr id="3" name="Content Placeholder 2"/>
+          <p:cNvSpPr>
+            <a:spLocks noGrp="1"/>
+          </p:cNvSpPr>
+          <p:nvPr>
+            <p:ph idx="1"/>
+          </p:nvPr>
+        </p:nvSpPr>
+        <p:spPr/>
+        <p:txBody>
+          <a:bodyPr>
+            <a:normAutofit lnSpcReduction="10000"/>
+          </a:bodyPr>
+          <a:lstStyle/>
+          <a:p>
+            <a:r>
+              <a:rPr lang="en-US"/>
+              <a:t>Mouse Allergen and Asthma Cohort Study</a:t>
+            </a:r>
+          </a:p>
+          <a:p>
+            <a:r>
+              <a:rPr lang="en-US"/>
+              <a:t>Baltimore children (aged 5—17)</a:t>
+            </a:r>
+          </a:p>
+          <a:p>
+            <a:r>
+              <a:rPr lang="en-US"/>
+              <a:t>Persistent asthma, exacerbation in past year</a:t>
+            </a:r>
+          </a:p>
+          <a:p>
+            <a:r>
+              <a:rPr lang="en-US"/>
+              <a:t>Study indoor environment and its relationship with asthma morbidity</a:t>
+            </a:r>
+          </a:p>
+          <a:p>
+            <a:r>
+              <a:rPr lang="en-US"/>
+              <a:t>Recent publication: http://goo.gl/WqE9j8</a:t>
+            </a:r>
+          </a:p>
+        </p:txBody>
+      </p:sp>
+    </p:spTree>
+    <p:extLst>
+      <p:ext uri="{BB962C8B-B14F-4D97-AF65-F5344CB8AC3E}">
+        <p14:creationId xmlns:p14="http://schemas.microsoft.com/office/powerpoint/2010/main" val="635063849"/>
+      </p:ext>
+    </p:extLst>
+  </p:cSld>
+  <p:clrMapOvr>
+    <a:masterClrMapping/>
+  </p:clrMapOvr>
+  <p:timing>
+    <p:tnLst>
+      <p:par>
+        <p:cTn id="1" dur="indefinite" restart="never" nodeType="tmRoot"/>
+      </p:par>
+    </p:tnLst>
+  </p:timing>
+</p:sld>
+</file>
+
+<file path=ppt/slides/slide19.xml><?xml version="1.0" encoding="utf-8"?>
 <p:sld xmlns:a="http://schemas.openxmlformats.org/drawingml/2006/main" xmlns:r="http://schemas.openxmlformats.org/officeDocument/2006/relationships" xmlns:p="http://schemas.openxmlformats.org/presentationml/2006/main">
   <p:cSld>
     <p:spTree>
@@ -4928,14 +5110,160 @@
   <p:timing>
     <p:tnLst>
       <p:par>
-        <p:cTn xmlns:p14="http://schemas.microsoft.com/office/powerpoint/2010/main" id="1" dur="indefinite" restart="never" nodeType="tmRoot"/>
+        <p:cTn id="1" dur="indefinite" restart="never" nodeType="tmRoot"/>
       </p:par>
     </p:tnLst>
   </p:timing>
 </p:sld>
 </file>
 
-<file path=ppt/slides/slide19.xml><?xml version="1.0" encoding="utf-8"?>
+<file path=ppt/slides/slide2.xml><?xml version="1.0" encoding="utf-8"?>
+<p:sld xmlns:a="http://schemas.openxmlformats.org/drawingml/2006/main" xmlns:r="http://schemas.openxmlformats.org/officeDocument/2006/relationships" xmlns:p="http://schemas.openxmlformats.org/presentationml/2006/main">
+  <p:cSld>
+    <p:spTree>
+      <p:nvGrpSpPr>
+        <p:cNvPr id="1" name=""/>
+        <p:cNvGrpSpPr/>
+        <p:nvPr/>
+      </p:nvGrpSpPr>
+      <p:grpSpPr>
+        <a:xfrm>
+          <a:off x="0" y="0"/>
+          <a:ext cx="0" cy="0"/>
+          <a:chOff x="0" y="0"/>
+          <a:chExt cx="0" cy="0"/>
+        </a:xfrm>
+      </p:grpSpPr>
+      <p:sp>
+        <p:nvSpPr>
+          <p:cNvPr id="2" name="Title 1"/>
+          <p:cNvSpPr>
+            <a:spLocks noGrp="1"/>
+          </p:cNvSpPr>
+          <p:nvPr>
+            <p:ph type="title"/>
+          </p:nvPr>
+        </p:nvSpPr>
+        <p:spPr/>
+        <p:txBody>
+          <a:bodyPr/>
+          <a:lstStyle/>
+          <a:p>
+            <a:r>
+              <a:rPr lang="en-US"/>
+              <a:t>What is ggplot2?</a:t>
+            </a:r>
+          </a:p>
+        </p:txBody>
+      </p:sp>
+      <p:sp>
+        <p:nvSpPr>
+          <p:cNvPr id="3" name="Content Placeholder 2"/>
+          <p:cNvSpPr>
+            <a:spLocks noGrp="1"/>
+          </p:cNvSpPr>
+          <p:nvPr>
+            <p:ph idx="1"/>
+          </p:nvPr>
+        </p:nvSpPr>
+        <p:spPr/>
+        <p:txBody>
+          <a:bodyPr>
+            <a:normAutofit fontScale="92500" lnSpcReduction="20000"/>
+          </a:bodyPr>
+          <a:lstStyle/>
+          <a:p>
+            <a:r>
+              <a:rPr lang="en-US"/>
+              <a:t>An implementation of the </a:t>
+            </a:r>
+            <a:r>
+              <a:rPr lang="en-US" i="1"/>
+              <a:t>Grammar of Graphics</a:t>
+            </a:r>
+            <a:r>
+              <a:rPr lang="en-US"/>
+              <a:t> by Leland Wilkinson</a:t>
+            </a:r>
+          </a:p>
+          <a:p>
+            <a:r>
+              <a:rPr lang="en-US"/>
+              <a:t>Written by Hadley Wickham (while he was a graduate student at Iowa State)</a:t>
+            </a:r>
+          </a:p>
+          <a:p>
+            <a:r>
+              <a:rPr lang="en-US"/>
+              <a:t>A “third” graphics system for R (along with </a:t>
+            </a:r>
+            <a:r>
+              <a:rPr lang="en-US" b="1"/>
+              <a:t>base</a:t>
+            </a:r>
+            <a:r>
+              <a:rPr lang="en-US"/>
+              <a:t> and </a:t>
+            </a:r>
+            <a:r>
+              <a:rPr lang="en-US" b="1"/>
+              <a:t>lattice</a:t>
+            </a:r>
+            <a:r>
+              <a:rPr lang="en-US"/>
+              <a:t>)</a:t>
+            </a:r>
+          </a:p>
+          <a:p>
+            <a:r>
+              <a:rPr lang="en-US"/>
+              <a:t>Available from CRAN via </a:t>
+            </a:r>
+            <a:r>
+              <a:rPr lang="en-US" sz="2800">
+                <a:latin typeface="Courier"/>
+                <a:cs typeface="Courier"/>
+              </a:rPr>
+              <a:t>install.packages()</a:t>
+            </a:r>
+          </a:p>
+          <a:p>
+            <a:r>
+              <a:rPr lang="en-US" sz="2800">
+                <a:cs typeface="Courier"/>
+              </a:rPr>
+              <a:t>Web site: </a:t>
+            </a:r>
+            <a:r>
+              <a:rPr lang="en-US" sz="2800">
+                <a:cs typeface="Courier"/>
+                <a:hlinkClick r:id="rId2"/>
+              </a:rPr>
+              <a:t>http://ggplot2.org</a:t>
+            </a:r>
+            <a:r>
+              <a:rPr lang="en-US" sz="2800">
+                <a:cs typeface="Courier"/>
+              </a:rPr>
+              <a:t> (better documentation)</a:t>
+            </a:r>
+          </a:p>
+        </p:txBody>
+      </p:sp>
+    </p:spTree>
+    <p:extLst>
+      <p:ext uri="{BB962C8B-B14F-4D97-AF65-F5344CB8AC3E}">
+        <p14:creationId xmlns:p14="http://schemas.microsoft.com/office/powerpoint/2010/main" val="2687038715"/>
+      </p:ext>
+    </p:extLst>
+  </p:cSld>
+  <p:clrMapOvr>
+    <a:masterClrMapping/>
+  </p:clrMapOvr>
+</p:sld>
+</file>
+
+<file path=ppt/slides/slide20.xml><?xml version="1.0" encoding="utf-8"?>
 <p:sld xmlns:a="http://schemas.openxmlformats.org/drawingml/2006/main" xmlns:r="http://schemas.openxmlformats.org/officeDocument/2006/relationships" xmlns:p="http://schemas.openxmlformats.org/presentationml/2006/main">
   <p:cSld>
     <p:spTree>
@@ -5043,159 +5371,17 @@
   <p:clrMapOvr>
     <a:masterClrMapping/>
   </p:clrMapOvr>
+  <p:timing>
+    <p:tnLst>
+      <p:par>
+        <p:cTn id="1" dur="indefinite" restart="never" nodeType="tmRoot"/>
+      </p:par>
+    </p:tnLst>
+  </p:timing>
 </p:sld>
 </file>
 
-<file path=ppt/slides/slide2.xml><?xml version="1.0" encoding="utf-8"?>
-<p:sld xmlns:a="http://schemas.openxmlformats.org/drawingml/2006/main" xmlns:r="http://schemas.openxmlformats.org/officeDocument/2006/relationships" xmlns:p="http://schemas.openxmlformats.org/presentationml/2006/main">
-  <p:cSld>
-    <p:spTree>
-      <p:nvGrpSpPr>
-        <p:cNvPr id="1" name=""/>
-        <p:cNvGrpSpPr/>
-        <p:nvPr/>
-      </p:nvGrpSpPr>
-      <p:grpSpPr>
-        <a:xfrm>
-          <a:off x="0" y="0"/>
-          <a:ext cx="0" cy="0"/>
-          <a:chOff x="0" y="0"/>
-          <a:chExt cx="0" cy="0"/>
-        </a:xfrm>
-      </p:grpSpPr>
-      <p:sp>
-        <p:nvSpPr>
-          <p:cNvPr id="2" name="Title 1"/>
-          <p:cNvSpPr>
-            <a:spLocks noGrp="1"/>
-          </p:cNvSpPr>
-          <p:nvPr>
-            <p:ph type="title"/>
-          </p:nvPr>
-        </p:nvSpPr>
-        <p:spPr/>
-        <p:txBody>
-          <a:bodyPr/>
-          <a:lstStyle/>
-          <a:p>
-            <a:r>
-              <a:rPr lang="en-US"/>
-              <a:t>What is ggplot2?</a:t>
-            </a:r>
-          </a:p>
-        </p:txBody>
-      </p:sp>
-      <p:sp>
-        <p:nvSpPr>
-          <p:cNvPr id="3" name="Content Placeholder 2"/>
-          <p:cNvSpPr>
-            <a:spLocks noGrp="1"/>
-          </p:cNvSpPr>
-          <p:nvPr>
-            <p:ph idx="1"/>
-          </p:nvPr>
-        </p:nvSpPr>
-        <p:spPr/>
-        <p:txBody>
-          <a:bodyPr>
-            <a:normAutofit fontScale="92500" lnSpcReduction="20000"/>
-          </a:bodyPr>
-          <a:lstStyle/>
-          <a:p>
-            <a:r>
-              <a:rPr lang="en-US"/>
-              <a:t>An implementation of the </a:t>
-            </a:r>
-            <a:r>
-              <a:rPr lang="en-US" i="1"/>
-              <a:t>Grammar of Graphics</a:t>
-            </a:r>
-            <a:r>
-              <a:rPr lang="en-US"/>
-              <a:t> by Leland Wilkinson</a:t>
-            </a:r>
-          </a:p>
-          <a:p>
-            <a:r>
-              <a:rPr lang="en-US"/>
-              <a:t>Written by Hadley Wickham (while he was a graduate student at Iowa State)</a:t>
-            </a:r>
-          </a:p>
-          <a:p>
-            <a:r>
-              <a:rPr lang="en-US"/>
-              <a:t>A “third” graphics system for R (along with </a:t>
-            </a:r>
-            <a:r>
-              <a:rPr lang="en-US" b="1"/>
-              <a:t>base</a:t>
-            </a:r>
-            <a:r>
-              <a:rPr lang="en-US"/>
-              <a:t> and </a:t>
-            </a:r>
-            <a:r>
-              <a:rPr lang="en-US" b="1"/>
-              <a:t>lattice</a:t>
-            </a:r>
-            <a:r>
-              <a:rPr lang="en-US"/>
-              <a:t>)</a:t>
-            </a:r>
-          </a:p>
-          <a:p>
-            <a:r>
-              <a:rPr lang="en-US"/>
-              <a:t>Available from CRAN via </a:t>
-            </a:r>
-            <a:r>
-              <a:rPr lang="en-US" sz="2800">
-                <a:latin typeface="Courier"/>
-                <a:cs typeface="Courier"/>
-              </a:rPr>
-              <a:t>install.packages()</a:t>
-            </a:r>
-          </a:p>
-          <a:p>
-            <a:r>
-              <a:rPr lang="en-US" sz="2800">
-                <a:cs typeface="Courier"/>
-              </a:rPr>
-              <a:t>Web site: </a:t>
-            </a:r>
-            <a:r>
-              <a:rPr lang="en-US" sz="2800">
-                <a:cs typeface="Courier"/>
-                <a:hlinkClick r:id="rId2"/>
-              </a:rPr>
-              <a:t>http://ggplot2.org</a:t>
-            </a:r>
-            <a:r>
-              <a:rPr lang="en-US" sz="2800">
-                <a:cs typeface="Courier"/>
-              </a:rPr>
-              <a:t> (better documentation)</a:t>
-            </a:r>
-            <a:endParaRPr lang="en-US" sz="2800">
-              <a:cs typeface="Courier"/>
-            </a:endParaRPr>
-          </a:p>
-        </p:txBody>
-      </p:sp>
-    </p:spTree>
-    <p:extLst>
-      <p:ext uri="{BB962C8B-B14F-4D97-AF65-F5344CB8AC3E}">
-        <p14:creationId xmlns:p14="http://schemas.microsoft.com/office/powerpoint/2010/main" val="2687038715"/>
-      </p:ext>
-    </p:extLst>
-  </p:cSld>
-  <p:clrMapOvr>
-    <a:masterClrMapping/>
-  </p:clrMapOvr>
-</p:sld>
-</file>
-
-<file path=ppt/slides/slide20.xml><?xml version="1.0" encoding="utf-8"?>
+<file path=ppt/slides/slide21.xml><?xml version="1.0" encoding="utf-8"?>
 <p:sld xmlns:a="http://schemas.openxmlformats.org/drawingml/2006/main" xmlns:r="http://schemas.openxmlformats.org/officeDocument/2006/relationships" xmlns:p="http://schemas.openxmlformats.org/presentationml/2006/main">
   <p:cSld>
     <p:spTree>
@@ -5303,10 +5489,17 @@
   <p:clrMapOvr>
     <a:masterClrMapping/>
   </p:clrMapOvr>
+  <p:timing>
+    <p:tnLst>
+      <p:par>
+        <p:cTn id="1" dur="indefinite" restart="never" nodeType="tmRoot"/>
+      </p:par>
+    </p:tnLst>
+  </p:timing>
 </p:sld>
 </file>
 
-<file path=ppt/slides/slide21.xml><?xml version="1.0" encoding="utf-8"?>
+<file path=ppt/slides/slide22.xml><?xml version="1.0" encoding="utf-8"?>
 <p:sld xmlns:a="http://schemas.openxmlformats.org/drawingml/2006/main" xmlns:r="http://schemas.openxmlformats.org/officeDocument/2006/relationships" xmlns:p="http://schemas.openxmlformats.org/presentationml/2006/main">
   <p:cSld>
     <p:spTree>
@@ -5473,10 +5666,17 @@
   <p:clrMapOvr>
     <a:masterClrMapping/>
   </p:clrMapOvr>
+  <p:timing>
+    <p:tnLst>
+      <p:par>
+        <p:cTn id="1" dur="indefinite" restart="never" nodeType="tmRoot"/>
+      </p:par>
+    </p:tnLst>
+  </p:timing>
 </p:sld>
 </file>
 
-<file path=ppt/slides/slide22.xml><?xml version="1.0" encoding="utf-8"?>
+<file path=ppt/slides/slide23.xml><?xml version="1.0" encoding="utf-8"?>
 <p:sld xmlns:a="http://schemas.openxmlformats.org/drawingml/2006/main" xmlns:r="http://schemas.openxmlformats.org/officeDocument/2006/relationships" xmlns:p="http://schemas.openxmlformats.org/presentationml/2006/main">
   <p:cSld>
     <p:spTree>
@@ -5721,10 +5921,17 @@
   <p:clrMapOvr>
     <a:masterClrMapping/>
   </p:clrMapOvr>
+  <p:timing>
+    <p:tnLst>
+      <p:par>
+        <p:cTn id="1" dur="indefinite" restart="never" nodeType="tmRoot"/>
+      </p:par>
+    </p:tnLst>
+  </p:timing>
 </p:sld>
 </file>
 
-<file path=ppt/slides/slide23.xml><?xml version="1.0" encoding="utf-8"?>
+<file path=ppt/slides/slide24.xml><?xml version="1.0" encoding="utf-8"?>
 <p:sld xmlns:a="http://schemas.openxmlformats.org/drawingml/2006/main" xmlns:r="http://schemas.openxmlformats.org/officeDocument/2006/relationships" xmlns:p="http://schemas.openxmlformats.org/presentationml/2006/main">
   <p:cSld>
     <p:spTree>
@@ -5809,7 +6016,7 @@
         <p:spPr>
           <a:xfrm>
             <a:off x="197057" y="4635799"/>
-            <a:ext cx="8676975" cy="338554"/>
+            <a:ext cx="7610738" cy="338554"/>
           </a:xfrm>
           <a:prstGeom prst="rect">
             <a:avLst/>
@@ -5823,8 +6030,52 @@
           <a:lstStyle/>
           <a:p>
             <a:r>
-              <a:rPr lang="en-US" sz="1600"/>
-              <a:t>qplot(log(pm25), log(eno), data = maacs, color = mopos, geom = c("point", "smooth"), method = "lm")</a:t>
+              <a:rPr lang="en-US" sz="1600" dirty="0" err="1"/>
+              <a:t>qplot</a:t>
+            </a:r>
+            <a:r>
+              <a:rPr lang="en-US" sz="1600" dirty="0"/>
+              <a:t>(log(pm25), log(</a:t>
+            </a:r>
+            <a:r>
+              <a:rPr lang="en-US" sz="1600" dirty="0" err="1"/>
+              <a:t>eno</a:t>
+            </a:r>
+            <a:r>
+              <a:rPr lang="en-US" sz="1600" dirty="0"/>
+              <a:t>), data = </a:t>
+            </a:r>
+            <a:r>
+              <a:rPr lang="en-US" sz="1600" dirty="0" err="1"/>
+              <a:t>maacs</a:t>
+            </a:r>
+            <a:r>
+              <a:rPr lang="en-US" sz="1600" dirty="0"/>
+              <a:t>, color = </a:t>
+            </a:r>
+            <a:r>
+              <a:rPr lang="en-US" sz="1600" dirty="0" err="1" smtClean="0"/>
+              <a:t>mopos</a:t>
+            </a:r>
+            <a:r>
+              <a:rPr lang="en-US" sz="1600" dirty="0" smtClean="0"/>
+              <a:t>) + </a:t>
+            </a:r>
+            <a:r>
+              <a:rPr lang="en-US" sz="1600" dirty="0" err="1" smtClean="0"/>
+              <a:t>geom_smooth</a:t>
+            </a:r>
+            <a:r>
+              <a:rPr lang="en-US" sz="1600" dirty="0" smtClean="0"/>
+              <a:t>(</a:t>
+            </a:r>
+            <a:r>
+              <a:rPr lang="en-US" sz="1600" dirty="0" smtClean="0"/>
+              <a:t>method = </a:t>
+            </a:r>
+            <a:r>
+              <a:rPr lang="en-US" sz="1600" dirty="0"/>
+              <a:t>"lm")</a:t>
             </a:r>
           </a:p>
         </p:txBody>
@@ -5837,8 +6088,8 @@
         </p:nvSpPr>
         <p:spPr>
           <a:xfrm>
-            <a:off x="4893586" y="4646748"/>
-            <a:ext cx="2452267" cy="338554"/>
+            <a:off x="5100976" y="4624850"/>
+            <a:ext cx="2563016" cy="338554"/>
           </a:xfrm>
           <a:prstGeom prst="rect">
             <a:avLst/>
@@ -5897,7 +6148,7 @@
         </p:nvSpPr>
         <p:spPr>
           <a:xfrm>
-            <a:off x="7400590" y="4646748"/>
+            <a:off x="3610615" y="4624850"/>
             <a:ext cx="1346558" cy="338554"/>
           </a:xfrm>
           <a:prstGeom prst="rect">
@@ -5962,7 +6213,7 @@
   <p:timing>
     <p:tnLst>
       <p:par>
-        <p:cTn xmlns:p14="http://schemas.microsoft.com/office/powerpoint/2010/main" id="1" dur="indefinite" restart="never" nodeType="tmRoot">
+        <p:cTn id="1" dur="indefinite" restart="never" nodeType="tmRoot">
           <p:childTnLst>
             <p:seq concurrent="1" nextAc="seek">
               <p:cTn id="2" dur="indefinite" nodeType="mainSeq">
@@ -6086,7 +6337,7 @@
 </p:sld>
 </file>
 
-<file path=ppt/slides/slide24.xml><?xml version="1.0" encoding="utf-8"?>
+<file path=ppt/slides/slide25.xml><?xml version="1.0" encoding="utf-8"?>
 <p:sld xmlns:a="http://schemas.openxmlformats.org/drawingml/2006/main" xmlns:r="http://schemas.openxmlformats.org/officeDocument/2006/relationships" xmlns:p="http://schemas.openxmlformats.org/presentationml/2006/main">
   <p:cSld>
     <p:spTree>
@@ -6169,7 +6420,7 @@
         <p:spPr>
           <a:xfrm>
             <a:off x="77631" y="4675415"/>
-            <a:ext cx="9000681" cy="338554"/>
+            <a:ext cx="7950510" cy="338554"/>
           </a:xfrm>
           <a:prstGeom prst="rect">
             <a:avLst/>
@@ -6183,9 +6434,50 @@
           <a:lstStyle/>
           <a:p>
             <a:r>
-              <a:rPr lang="en-US" sz="1600"/>
-              <a:t>qplot(log(pm25), log(eno), data = maacs, geom = c("point", "smooth"), method = "lm", facets = . ~ mopos)</a:t>
-            </a:r>
+              <a:rPr lang="en-US" sz="1600" dirty="0" err="1"/>
+              <a:t>qplot</a:t>
+            </a:r>
+            <a:r>
+              <a:rPr lang="en-US" sz="1600" dirty="0"/>
+              <a:t>(log(pm25), log(</a:t>
+            </a:r>
+            <a:r>
+              <a:rPr lang="en-US" sz="1600" dirty="0" err="1"/>
+              <a:t>eno</a:t>
+            </a:r>
+            <a:r>
+              <a:rPr lang="en-US" sz="1600" dirty="0"/>
+              <a:t>), data = </a:t>
+            </a:r>
+            <a:r>
+              <a:rPr lang="en-US" sz="1600" dirty="0" err="1" smtClean="0"/>
+              <a:t>maacs</a:t>
+            </a:r>
+            <a:r>
+              <a:rPr lang="en-US" sz="1600" dirty="0" smtClean="0"/>
+              <a:t>, </a:t>
+            </a:r>
+            <a:r>
+              <a:rPr lang="en-US" sz="1600" dirty="0"/>
+              <a:t>facets = . ~ </a:t>
+            </a:r>
+            <a:r>
+              <a:rPr lang="en-US" sz="1600" dirty="0" err="1"/>
+              <a:t>mopos</a:t>
+            </a:r>
+            <a:r>
+              <a:rPr lang="en-US" sz="1600" dirty="0" smtClean="0"/>
+              <a:t>) + </a:t>
+            </a:r>
+            <a:r>
+              <a:rPr lang="en-US" sz="1600" dirty="0" err="1" smtClean="0"/>
+              <a:t>geom_smooth</a:t>
+            </a:r>
+            <a:r>
+              <a:rPr lang="en-US" sz="1600" dirty="0" smtClean="0"/>
+              <a:t>(method = “lm”)</a:t>
+            </a:r>
+            <a:endParaRPr lang="en-US" sz="1600" dirty="0"/>
           </a:p>
         </p:txBody>
       </p:sp>
@@ -6197,7 +6489,7 @@
         </p:nvSpPr>
         <p:spPr>
           <a:xfrm>
-            <a:off x="7302063" y="4679595"/>
+            <a:off x="3567689" y="4675415"/>
             <a:ext cx="1598351" cy="338554"/>
           </a:xfrm>
           <a:prstGeom prst="rect">
@@ -6262,7 +6554,7 @@
   <p:timing>
     <p:tnLst>
       <p:par>
-        <p:cTn xmlns:p14="http://schemas.microsoft.com/office/powerpoint/2010/main" id="1" dur="indefinite" restart="never" nodeType="tmRoot">
+        <p:cTn id="1" dur="indefinite" restart="never" nodeType="tmRoot">
           <p:childTnLst>
             <p:seq concurrent="1" nextAc="seek">
               <p:cTn id="2" dur="indefinite" nodeType="mainSeq">
@@ -6340,184 +6632,6 @@
 </p:sld>
 </file>
 
-<file path=ppt/slides/slide25.xml><?xml version="1.0" encoding="utf-8"?>
-<p:sld xmlns:a="http://schemas.openxmlformats.org/drawingml/2006/main" xmlns:r="http://schemas.openxmlformats.org/officeDocument/2006/relationships" xmlns:p="http://schemas.openxmlformats.org/presentationml/2006/main">
-  <p:cSld>
-    <p:spTree>
-      <p:nvGrpSpPr>
-        <p:cNvPr id="1" name=""/>
-        <p:cNvGrpSpPr/>
-        <p:nvPr/>
-      </p:nvGrpSpPr>
-      <p:grpSpPr>
-        <a:xfrm>
-          <a:off x="0" y="0"/>
-          <a:ext cx="0" cy="0"/>
-          <a:chOff x="0" y="0"/>
-          <a:chExt cx="0" cy="0"/>
-        </a:xfrm>
-      </p:grpSpPr>
-      <p:sp>
-        <p:nvSpPr>
-          <p:cNvPr id="2" name="Title 1"/>
-          <p:cNvSpPr>
-            <a:spLocks noGrp="1"/>
-          </p:cNvSpPr>
-          <p:nvPr>
-            <p:ph type="title"/>
-          </p:nvPr>
-        </p:nvSpPr>
-        <p:spPr/>
-        <p:txBody>
-          <a:bodyPr/>
-          <a:lstStyle/>
-          <a:p>
-            <a:r>
-              <a:rPr lang="en-US"/>
-              <a:t>Basic Components of a ggplot2 Plot</a:t>
-            </a:r>
-          </a:p>
-        </p:txBody>
-      </p:sp>
-      <p:sp>
-        <p:nvSpPr>
-          <p:cNvPr id="3" name="Content Placeholder 2"/>
-          <p:cNvSpPr>
-            <a:spLocks noGrp="1"/>
-          </p:cNvSpPr>
-          <p:nvPr>
-            <p:ph idx="1"/>
-          </p:nvPr>
-        </p:nvSpPr>
-        <p:spPr>
-          <a:xfrm>
-            <a:off x="457200" y="1200150"/>
-            <a:ext cx="8229600" cy="3705199"/>
-          </a:xfrm>
-        </p:spPr>
-        <p:txBody>
-          <a:bodyPr>
-            <a:normAutofit fontScale="77500" lnSpcReduction="20000"/>
-          </a:bodyPr>
-          <a:lstStyle/>
-          <a:p>
-            <a:r>
-              <a:rPr lang="en-US"/>
-              <a:t>A </a:t>
-            </a:r>
-            <a:r>
-              <a:rPr lang="en-US" b="1"/>
-              <a:t>data frame</a:t>
-            </a:r>
-          </a:p>
-          <a:p>
-            <a:r>
-              <a:rPr lang="en-US" b="1"/>
-              <a:t>aesthetic</a:t>
-            </a:r>
-            <a:r>
-              <a:rPr lang="en-US"/>
-              <a:t> </a:t>
-            </a:r>
-            <a:r>
-              <a:rPr lang="en-US" b="1"/>
-              <a:t>mappings</a:t>
-            </a:r>
-            <a:r>
-              <a:rPr lang="en-US"/>
-              <a:t>: how data are mapped to color, size </a:t>
-            </a:r>
-            <a:endParaRPr lang="en-US">
-              <a:effectLst/>
-            </a:endParaRPr>
-          </a:p>
-          <a:p>
-            <a:r>
-              <a:rPr lang="en-US" b="1"/>
-              <a:t>geoms</a:t>
-            </a:r>
-            <a:r>
-              <a:rPr lang="en-US"/>
-              <a:t>: geometric objects like points, lines, shapes. </a:t>
-            </a:r>
-            <a:endParaRPr lang="en-US">
-              <a:effectLst/>
-            </a:endParaRPr>
-          </a:p>
-          <a:p>
-            <a:r>
-              <a:rPr lang="en-US" b="1"/>
-              <a:t>facets</a:t>
-            </a:r>
-            <a:r>
-              <a:rPr lang="en-US"/>
-              <a:t>: for conditional plots. </a:t>
-            </a:r>
-          </a:p>
-          <a:p>
-            <a:r>
-              <a:rPr lang="en-US" b="1"/>
-              <a:t>stats</a:t>
-            </a:r>
-            <a:r>
-              <a:rPr lang="en-US"/>
-              <a:t>: statistical transformations like binning, quantiles, smoothing. </a:t>
-            </a:r>
-            <a:endParaRPr lang="en-US">
-              <a:effectLst/>
-            </a:endParaRPr>
-          </a:p>
-          <a:p>
-            <a:r>
-              <a:rPr lang="en-US" b="1"/>
-              <a:t>scales</a:t>
-            </a:r>
-            <a:r>
-              <a:rPr lang="en-US"/>
-              <a:t>: what scale an aesthetic map uses (example: male = red, female = blue). </a:t>
-            </a:r>
-            <a:endParaRPr lang="en-US">
-              <a:effectLst/>
-            </a:endParaRPr>
-          </a:p>
-          <a:p>
-            <a:r>
-              <a:rPr lang="en-US" b="1"/>
-              <a:t>coordinate system</a:t>
-            </a:r>
-            <a:r>
-              <a:rPr lang="en-US"/>
-              <a:t> </a:t>
-            </a:r>
-            <a:endParaRPr lang="en-US">
-              <a:effectLst/>
-            </a:endParaRPr>
-          </a:p>
-          <a:p>
-            <a:endParaRPr lang="en-US"/>
-          </a:p>
-        </p:txBody>
-      </p:sp>
-    </p:spTree>
-    <p:extLst>
-      <p:ext uri="{BB962C8B-B14F-4D97-AF65-F5344CB8AC3E}">
-        <p14:creationId xmlns:p14="http://schemas.microsoft.com/office/powerpoint/2010/main" val="3027572014"/>
-      </p:ext>
-    </p:extLst>
-  </p:cSld>
-  <p:clrMapOvr>
-    <a:masterClrMapping/>
-  </p:clrMapOvr>
-  <p:timing>
-    <p:tnLst>
-      <p:par>
-        <p:cTn xmlns:p14="http://schemas.microsoft.com/office/powerpoint/2010/main" id="1" dur="indefinite" restart="never" nodeType="tmRoot"/>
-      </p:par>
-    </p:tnLst>
-  </p:timing>
-</p:sld>
-</file>
-
 <file path=ppt/slides/slide26.xml><?xml version="1.0" encoding="utf-8"?>
 <p:sld xmlns:a="http://schemas.openxmlformats.org/drawingml/2006/main" xmlns:r="http://schemas.openxmlformats.org/officeDocument/2006/relationships" xmlns:p="http://schemas.openxmlformats.org/presentationml/2006/main">
   <p:cSld>
@@ -6552,7 +6666,7 @@
           <a:p>
             <a:r>
               <a:rPr lang="en-US"/>
-              <a:t>Summary of qplot()</a:t>
+              <a:t>Basic Components of a ggplot2 Plot</a:t>
             </a:r>
           </a:p>
         </p:txBody>
@@ -6567,42 +6681,119 @@
             <p:ph idx="1"/>
           </p:nvPr>
         </p:nvSpPr>
-        <p:spPr/>
+        <p:spPr>
+          <a:xfrm>
+            <a:off x="457200" y="1200150"/>
+            <a:ext cx="8229600" cy="3705199"/>
+          </a:xfrm>
+        </p:spPr>
         <p:txBody>
           <a:bodyPr>
-            <a:normAutofit fontScale="92500" lnSpcReduction="10000"/>
+            <a:normAutofit fontScale="77500" lnSpcReduction="20000"/>
           </a:bodyPr>
           <a:lstStyle/>
           <a:p>
             <a:r>
               <a:rPr lang="en-US"/>
-              <a:t>The qplot() function is the analog to plot() but with many built-in features</a:t>
-            </a:r>
-          </a:p>
-          <a:p>
-            <a:r>
-              <a:rPr lang="en-US"/>
-              <a:t>Syntax somewhere in between base/lattice</a:t>
-            </a:r>
-          </a:p>
-          <a:p>
-            <a:r>
-              <a:rPr lang="en-US"/>
-              <a:t>Produces very nice graphics, essentially publication ready (if you like the design)</a:t>
-            </a:r>
-          </a:p>
-          <a:p>
-            <a:r>
-              <a:rPr lang="en-US"/>
-              <a:t>Difficult to go against the grain/customize (don’t bother; use full ggplot2 power in that case)</a:t>
-            </a:r>
+              <a:t>A </a:t>
+            </a:r>
+            <a:r>
+              <a:rPr lang="en-US" b="1"/>
+              <a:t>data frame</a:t>
+            </a:r>
+          </a:p>
+          <a:p>
+            <a:r>
+              <a:rPr lang="en-US" b="1"/>
+              <a:t>aesthetic</a:t>
+            </a:r>
+            <a:r>
+              <a:rPr lang="en-US"/>
+              <a:t> </a:t>
+            </a:r>
+            <a:r>
+              <a:rPr lang="en-US" b="1"/>
+              <a:t>mappings</a:t>
+            </a:r>
+            <a:r>
+              <a:rPr lang="en-US"/>
+              <a:t>: how data are mapped to color, size </a:t>
+            </a:r>
+            <a:endParaRPr lang="en-US">
+              <a:effectLst/>
+            </a:endParaRPr>
+          </a:p>
+          <a:p>
+            <a:r>
+              <a:rPr lang="en-US" b="1"/>
+              <a:t>geoms</a:t>
+            </a:r>
+            <a:r>
+              <a:rPr lang="en-US"/>
+              <a:t>: geometric objects like points, lines, shapes. </a:t>
+            </a:r>
+            <a:endParaRPr lang="en-US">
+              <a:effectLst/>
+            </a:endParaRPr>
+          </a:p>
+          <a:p>
+            <a:r>
+              <a:rPr lang="en-US" b="1"/>
+              <a:t>facets</a:t>
+            </a:r>
+            <a:r>
+              <a:rPr lang="en-US"/>
+              <a:t>: for conditional plots. </a:t>
+            </a:r>
+          </a:p>
+          <a:p>
+            <a:r>
+              <a:rPr lang="en-US" b="1"/>
+              <a:t>stats</a:t>
+            </a:r>
+            <a:r>
+              <a:rPr lang="en-US"/>
+              <a:t>: statistical transformations like binning, quantiles, smoothing. </a:t>
+            </a:r>
+            <a:endParaRPr lang="en-US">
+              <a:effectLst/>
+            </a:endParaRPr>
+          </a:p>
+          <a:p>
+            <a:r>
+              <a:rPr lang="en-US" b="1"/>
+              <a:t>scales</a:t>
+            </a:r>
+            <a:r>
+              <a:rPr lang="en-US"/>
+              <a:t>: what scale an aesthetic map uses (example: male = red, female = blue). </a:t>
+            </a:r>
+            <a:endParaRPr lang="en-US">
+              <a:effectLst/>
+            </a:endParaRPr>
+          </a:p>
+          <a:p>
+            <a:r>
+              <a:rPr lang="en-US" b="1"/>
+              <a:t>coordinate system</a:t>
+            </a:r>
+            <a:r>
+              <a:rPr lang="en-US"/>
+              <a:t> </a:t>
+            </a:r>
+            <a:endParaRPr lang="en-US">
+              <a:effectLst/>
+            </a:endParaRPr>
+          </a:p>
+          <a:p>
+            <a:endParaRPr lang="en-US"/>
           </a:p>
         </p:txBody>
       </p:sp>
     </p:spTree>
     <p:extLst>
       <p:ext uri="{BB962C8B-B14F-4D97-AF65-F5344CB8AC3E}">
-        <p14:creationId xmlns:p14="http://schemas.microsoft.com/office/powerpoint/2010/main" val="229630789"/>
+        <p14:creationId xmlns:p14="http://schemas.microsoft.com/office/powerpoint/2010/main" val="3027572014"/>
       </p:ext>
     </p:extLst>
   </p:cSld>
@@ -6612,7 +6803,7 @@
   <p:timing>
     <p:tnLst>
       <p:par>
-        <p:cTn xmlns:p14="http://schemas.microsoft.com/office/powerpoint/2010/main" id="1" dur="indefinite" restart="never" nodeType="tmRoot"/>
+        <p:cTn id="1" dur="indefinite" restart="never" nodeType="tmRoot"/>
       </p:par>
     </p:tnLst>
   </p:timing>
@@ -6653,6 +6844,129 @@
           <a:p>
             <a:r>
               <a:rPr lang="en-US"/>
+              <a:t>Summary of qplot()</a:t>
+            </a:r>
+          </a:p>
+        </p:txBody>
+      </p:sp>
+      <p:sp>
+        <p:nvSpPr>
+          <p:cNvPr id="3" name="Content Placeholder 2"/>
+          <p:cNvSpPr>
+            <a:spLocks noGrp="1"/>
+          </p:cNvSpPr>
+          <p:nvPr>
+            <p:ph idx="1"/>
+          </p:nvPr>
+        </p:nvSpPr>
+        <p:spPr/>
+        <p:txBody>
+          <a:bodyPr>
+            <a:normAutofit fontScale="92500"/>
+          </a:bodyPr>
+          <a:lstStyle/>
+          <a:p>
+            <a:r>
+              <a:rPr lang="en-US" dirty="0"/>
+              <a:t>The </a:t>
+            </a:r>
+            <a:r>
+              <a:rPr lang="en-US" dirty="0" err="1"/>
+              <a:t>qplot</a:t>
+            </a:r>
+            <a:r>
+              <a:rPr lang="en-US" dirty="0"/>
+              <a:t>() function is the analog to plot() but with many built-in features</a:t>
+            </a:r>
+          </a:p>
+          <a:p>
+            <a:r>
+              <a:rPr lang="en-US" dirty="0" smtClean="0"/>
+              <a:t>Produces </a:t>
+            </a:r>
+            <a:r>
+              <a:rPr lang="en-US" dirty="0"/>
+              <a:t>very nice </a:t>
+            </a:r>
+            <a:r>
+              <a:rPr lang="en-US" dirty="0" smtClean="0"/>
+              <a:t>graphics </a:t>
+            </a:r>
+            <a:r>
+              <a:rPr lang="en-US" i="1" dirty="0" smtClean="0"/>
+              <a:t>quickly</a:t>
+            </a:r>
+            <a:r>
+              <a:rPr lang="en-US" dirty="0" smtClean="0"/>
+              <a:t>, </a:t>
+            </a:r>
+            <a:r>
+              <a:rPr lang="en-US" dirty="0"/>
+              <a:t>essentially publication ready (if you like the design)</a:t>
+            </a:r>
+          </a:p>
+          <a:p>
+            <a:r>
+              <a:rPr lang="en-US" dirty="0"/>
+              <a:t>Difficult to go against the grain/customize (don’t bother; use full ggplot2 power in that case)</a:t>
+            </a:r>
+          </a:p>
+        </p:txBody>
+      </p:sp>
+    </p:spTree>
+    <p:extLst>
+      <p:ext uri="{BB962C8B-B14F-4D97-AF65-F5344CB8AC3E}">
+        <p14:creationId xmlns:p14="http://schemas.microsoft.com/office/powerpoint/2010/main" val="229630789"/>
+      </p:ext>
+    </p:extLst>
+  </p:cSld>
+  <p:clrMapOvr>
+    <a:masterClrMapping/>
+  </p:clrMapOvr>
+  <p:timing>
+    <p:tnLst>
+      <p:par>
+        <p:cTn id="1" dur="indefinite" restart="never" nodeType="tmRoot"/>
+      </p:par>
+    </p:tnLst>
+  </p:timing>
+</p:sld>
+</file>
+
+<file path=ppt/slides/slide28.xml><?xml version="1.0" encoding="utf-8"?>
+<p:sld xmlns:a="http://schemas.openxmlformats.org/drawingml/2006/main" xmlns:r="http://schemas.openxmlformats.org/officeDocument/2006/relationships" xmlns:p="http://schemas.openxmlformats.org/presentationml/2006/main">
+  <p:cSld>
+    <p:spTree>
+      <p:nvGrpSpPr>
+        <p:cNvPr id="1" name=""/>
+        <p:cNvGrpSpPr/>
+        <p:nvPr/>
+      </p:nvGrpSpPr>
+      <p:grpSpPr>
+        <a:xfrm>
+          <a:off x="0" y="0"/>
+          <a:ext cx="0" cy="0"/>
+          <a:chOff x="0" y="0"/>
+          <a:chExt cx="0" cy="0"/>
+        </a:xfrm>
+      </p:grpSpPr>
+      <p:sp>
+        <p:nvSpPr>
+          <p:cNvPr id="2" name="Title 1"/>
+          <p:cNvSpPr>
+            <a:spLocks noGrp="1"/>
+          </p:cNvSpPr>
+          <p:nvPr>
+            <p:ph type="title"/>
+          </p:nvPr>
+        </p:nvSpPr>
+        <p:spPr/>
+        <p:txBody>
+          <a:bodyPr/>
+          <a:lstStyle/>
+          <a:p>
+            <a:r>
+              <a:rPr lang="en-US"/>
               <a:t>Resources</a:t>
             </a:r>
           </a:p>
@@ -6744,6 +7058,13 @@
   <p:clrMapOvr>
     <a:masterClrMapping/>
   </p:clrMapOvr>
+  <p:timing>
+    <p:tnLst>
+      <p:par>
+        <p:cTn id="1" dur="indefinite" restart="never" nodeType="tmRoot"/>
+      </p:par>
+    </p:tnLst>
+  </p:timing>
 </p:sld>
 </file>
 
@@ -6902,31 +7223,51 @@
               <a:buNone/>
             </a:pPr>
             <a:r>
-              <a:rPr lang="en-US"/>
-              <a:t>“In brief, the grammar tells us that a statistical graphic is a </a:t>
-            </a:r>
-            <a:r>
-              <a:rPr lang="en-US" b="1"/>
+              <a:rPr lang="en-US" dirty="0" smtClean="0"/>
+              <a:t>“</a:t>
+            </a:r>
+            <a:r>
+              <a:rPr lang="is-IS" dirty="0" smtClean="0"/>
+              <a:t>…</a:t>
+            </a:r>
+            <a:r>
+              <a:rPr lang="en-US" dirty="0" smtClean="0"/>
+              <a:t>the </a:t>
+            </a:r>
+            <a:r>
+              <a:rPr lang="en-US" dirty="0"/>
+              <a:t>grammar tells us that a statistical graphic is a </a:t>
+            </a:r>
+            <a:r>
+              <a:rPr lang="en-US" b="1" dirty="0"/>
               <a:t>mapping</a:t>
             </a:r>
             <a:r>
-              <a:rPr lang="en-US"/>
+              <a:rPr lang="en-US" dirty="0"/>
               <a:t> from data to </a:t>
             </a:r>
             <a:r>
-              <a:rPr lang="en-US" b="1"/>
+              <a:rPr lang="en-US" b="1" dirty="0"/>
               <a:t>aesthetic</a:t>
             </a:r>
             <a:r>
-              <a:rPr lang="en-US"/>
-              <a:t> attributes (colour, shape, size) of </a:t>
-            </a:r>
-            <a:r>
-              <a:rPr lang="en-US" b="1"/>
+              <a:rPr lang="en-US" dirty="0"/>
+              <a:t> attributes (</a:t>
+            </a:r>
+            <a:r>
+              <a:rPr lang="en-US" dirty="0" err="1"/>
+              <a:t>colour</a:t>
+            </a:r>
+            <a:r>
+              <a:rPr lang="en-US" dirty="0"/>
+              <a:t>, shape, size) of </a:t>
+            </a:r>
+            <a:r>
+              <a:rPr lang="en-US" b="1" dirty="0"/>
               <a:t>geometric</a:t>
             </a:r>
             <a:r>
-              <a:rPr lang="en-US"/>
+              <a:rPr lang="en-US" dirty="0"/>
               <a:t> objects (points, lines, bars). The plot may also contain statistical transformations of the data and is drawn on a specific coordinate system”</a:t>
             </a:r>
           </a:p>
@@ -6935,20 +7276,20 @@
               <a:buNone/>
             </a:pPr>
             <a:r>
-              <a:rPr lang="en-US">
+              <a:rPr lang="en-US" dirty="0">
                 <a:effectLst/>
               </a:rPr>
               <a:t>from </a:t>
             </a:r>
             <a:r>
-              <a:rPr lang="en-US" i="1"/>
+              <a:rPr lang="en-US" i="1" dirty="0"/>
               <a:t>ggplot2</a:t>
             </a:r>
             <a:r>
-              <a:rPr lang="en-US"/>
+              <a:rPr lang="en-US" dirty="0"/>
               <a:t> book</a:t>
             </a:r>
-            <a:endParaRPr lang="en-US">
+            <a:endParaRPr lang="en-US" dirty="0">
               <a:effectLst/>
             </a:endParaRPr>
           </a:p>
@@ -7396,34 +7737,60 @@
         </p:nvSpPr>
         <p:spPr/>
         <p:txBody>
-          <a:bodyPr/>
-          <a:lstStyle/>
-          <a:p>
-            <a:r>
-              <a:rPr lang="en-US"/>
+          <a:bodyPr>
+            <a:normAutofit/>
+          </a:bodyPr>
+          <a:lstStyle/>
+          <a:p>
+            <a:r>
+              <a:rPr lang="en-US" dirty="0"/>
               <a:t>Sometimes awkward to specify an entire plot in a single function call</a:t>
             </a:r>
           </a:p>
           <a:p>
             <a:r>
-              <a:rPr lang="en-US"/>
+              <a:rPr lang="en-US" dirty="0"/>
               <a:t>Annotation in plot is not intuitive</a:t>
             </a:r>
           </a:p>
           <a:p>
             <a:r>
-              <a:rPr lang="en-US"/>
-              <a:t>Use of panel functions and subscripts difficult ot wield and requires intense preparation</a:t>
-            </a:r>
-          </a:p>
-          <a:p>
-            <a:r>
-              <a:rPr lang="en-US"/>
-              <a:t>Cannot “add” to the plot once it’s created</a:t>
-            </a:r>
-          </a:p>
-          <a:p>
-            <a:endParaRPr lang="en-US"/>
+              <a:rPr lang="en-US" dirty="0"/>
+              <a:t>Use of panel functions </a:t>
+            </a:r>
+            <a:r>
+              <a:rPr lang="en-US" dirty="0" smtClean="0"/>
+              <a:t>to annotate plots was </a:t>
+            </a:r>
+            <a:r>
+              <a:rPr lang="en-US" dirty="0" smtClean="0"/>
+              <a:t>difficult </a:t>
+            </a:r>
+            <a:r>
+              <a:rPr lang="en-US" dirty="0" smtClean="0"/>
+              <a:t>to </a:t>
+            </a:r>
+            <a:r>
+              <a:rPr lang="en-US" dirty="0" smtClean="0"/>
+              <a:t>wield </a:t>
+            </a:r>
+            <a:r>
+              <a:rPr lang="en-US" dirty="0"/>
+              <a:t>and </a:t>
+            </a:r>
+            <a:r>
+              <a:rPr lang="en-US" dirty="0" smtClean="0"/>
+              <a:t>required </a:t>
+            </a:r>
+            <a:r>
+              <a:rPr lang="en-US" dirty="0"/>
+              <a:t>intense </a:t>
+            </a:r>
+            <a:r>
+              <a:rPr lang="en-US" dirty="0" smtClean="0"/>
+              <a:t>preparation</a:t>
+            </a:r>
+            <a:endParaRPr lang="en-US" dirty="0"/>
           </a:p>
         </p:txBody>
       </p:sp>
@@ -7497,45 +7864,45 @@
         </p:spPr>
         <p:txBody>
           <a:bodyPr>
-            <a:normAutofit fontScale="92500" lnSpcReduction="10000"/>
+            <a:normAutofit lnSpcReduction="10000"/>
           </a:bodyPr>
           <a:lstStyle/>
           <a:p>
             <a:r>
-              <a:rPr lang="en-US"/>
-              <a:t>S</a:t>
-            </a:r>
-            <a:r>
-              <a:rPr lang="en-US"/>
-              <a:t>plit the difference between base and lattice</a:t>
-            </a:r>
-          </a:p>
-          <a:p>
-            <a:r>
-              <a:rPr lang="en-US"/>
-              <a:t>Automatically deals with spacings, text, titles but also allows you to annotate by “adding”</a:t>
-            </a:r>
-          </a:p>
-          <a:p>
-            <a:r>
-              <a:rPr lang="en-US"/>
+              <a:rPr lang="en-US" dirty="0"/>
+              <a:t>Split the difference between base and lattice</a:t>
+            </a:r>
+          </a:p>
+          <a:p>
+            <a:r>
+              <a:rPr lang="en-US" dirty="0"/>
+              <a:t>Automatically deals with </a:t>
+            </a:r>
+            <a:r>
+              <a:rPr lang="en-US" dirty="0" err="1"/>
+              <a:t>spacings</a:t>
+            </a:r>
+            <a:r>
+              <a:rPr lang="en-US" dirty="0"/>
+              <a:t>, text, titles but also allows you to annotate by “adding”</a:t>
+            </a:r>
+          </a:p>
+          <a:p>
+            <a:r>
+              <a:rPr lang="en-US" dirty="0"/>
               <a:t>Superficial similarity to lattice but generally easier/more intuitive to use</a:t>
             </a:r>
           </a:p>
           <a:p>
             <a:r>
-              <a:rPr lang="en-US"/>
-              <a:t>Default mode makes many choices for you: Think “Apple” rather than “Android” (but you </a:t>
-            </a:r>
-            <a:r>
-              <a:rPr lang="en-US" i="1"/>
-              <a:t>can</a:t>
-            </a:r>
-            <a:r>
-              <a:rPr lang="en-US"/>
-              <a:t> customize!)</a:t>
-            </a:r>
-            <a:endParaRPr lang="en-US"/>
+              <a:rPr lang="en-US" dirty="0"/>
+              <a:t>Default mode makes many choices for </a:t>
+            </a:r>
+            <a:r>
+              <a:rPr lang="en-US" dirty="0" smtClean="0"/>
+              <a:t>you (but you can customize)</a:t>
+            </a:r>
+            <a:endParaRPr lang="en-US" dirty="0"/>
           </a:p>
         </p:txBody>
       </p:sp>

</xml_diff>